<commit_message>
discussion room change. Small kruskal changes
</commit_message>
<xml_diff>
--- a/slides/02-Kruskal.pptx
+++ b/slides/02-Kruskal.pptx
@@ -8025,8 +8025,8 @@
           </a:p>
         </p:txBody>
       </p:sp>
-      <mc:AlternateContent xmlns:mc="http://schemas.openxmlformats.org/markup-compatibility/2006" xmlns:a14="http://schemas.microsoft.com/office/drawing/2010/main">
-        <mc:Choice Requires="a14">
+      <mc:AlternateContent xmlns:mc="http://schemas.openxmlformats.org/markup-compatibility/2006">
+        <mc:Choice xmlns:a14="http://schemas.microsoft.com/office/drawing/2010/main" Requires="a14">
           <p:sp>
             <p:nvSpPr>
               <p:cNvPr id="78852" name="Rectangle 3"/>
@@ -8287,7 +8287,13 @@
                           <a:rPr lang="en-US" sz="2100" b="0" i="1" smtClean="0">
                             <a:latin typeface="Cambria Math" panose="02040503050406030204" pitchFamily="18" charset="0"/>
                           </a:rPr>
-                          <m:t>∗</m:t>
+                          <m:t>∗2</m:t>
+                        </m:r>
+                        <m:r>
+                          <a:rPr lang="en-US" sz="2100" b="0" i="1" smtClean="0">
+                            <a:latin typeface="Cambria Math" panose="02040503050406030204" pitchFamily="18" charset="0"/>
+                          </a:rPr>
+                          <m:t>𝑓</m:t>
                         </m:r>
                         <m:d>
                           <m:dPr>
@@ -8302,62 +8308,52 @@
                               <a:rPr lang="en-US" sz="2100" b="0" i="1" smtClean="0">
                                 <a:latin typeface="Cambria Math" panose="02040503050406030204" pitchFamily="18" charset="0"/>
                               </a:rPr>
-                              <m:t>2</m:t>
+                              <m:t>𝑣</m:t>
                             </m:r>
-                            <m:r>
-                              <a:rPr lang="en-US" sz="2100" b="0" i="1" smtClean="0">
-                                <a:latin typeface="Cambria Math" panose="02040503050406030204" pitchFamily="18" charset="0"/>
-                              </a:rPr>
-                              <m:t>𝑓</m:t>
-                            </m:r>
-                            <m:d>
-                              <m:dPr>
-                                <m:ctrlPr>
-                                  <a:rPr lang="en-US" sz="2100" b="0" i="1" smtClean="0">
-                                    <a:latin typeface="Cambria Math" panose="02040503050406030204" pitchFamily="18" charset="0"/>
-                                  </a:rPr>
-                                </m:ctrlPr>
-                              </m:dPr>
-                              <m:e>
-                                <m:r>
-                                  <a:rPr lang="en-US" sz="2100" b="0" i="1" smtClean="0">
-                                    <a:latin typeface="Cambria Math" panose="02040503050406030204" pitchFamily="18" charset="0"/>
-                                  </a:rPr>
-                                  <m:t>𝑉</m:t>
-                                </m:r>
-                              </m:e>
-                            </m:d>
-                            <m:r>
-                              <a:rPr lang="en-US" sz="2100" b="0" i="1" smtClean="0">
-                                <a:latin typeface="Cambria Math" panose="02040503050406030204" pitchFamily="18" charset="0"/>
-                              </a:rPr>
-                              <m:t>+</m:t>
-                            </m:r>
-                            <m:r>
-                              <a:rPr lang="en-US" sz="2100" b="0" i="1" smtClean="0">
-                                <a:latin typeface="Cambria Math" panose="02040503050406030204" pitchFamily="18" charset="0"/>
-                              </a:rPr>
-                              <m:t>𝑢</m:t>
-                            </m:r>
-                            <m:d>
-                              <m:dPr>
-                                <m:ctrlPr>
-                                  <a:rPr lang="en-US" sz="2100" b="0" i="1" smtClean="0">
-                                    <a:latin typeface="Cambria Math" panose="02040503050406030204" pitchFamily="18" charset="0"/>
-                                  </a:rPr>
-                                </m:ctrlPr>
-                              </m:dPr>
-                              <m:e>
-                                <m:r>
-                                  <a:rPr lang="en-US" sz="2100" b="0" i="1" smtClean="0">
-                                    <a:latin typeface="Cambria Math" panose="02040503050406030204" pitchFamily="18" charset="0"/>
-                                  </a:rPr>
-                                  <m:t>𝑉</m:t>
-                                </m:r>
-                              </m:e>
-                            </m:d>
                           </m:e>
                         </m:d>
+                        <m:r>
+                          <a:rPr lang="en-US" sz="2100" b="0" i="1" smtClean="0">
+                            <a:latin typeface="Cambria Math" panose="02040503050406030204" pitchFamily="18" charset="0"/>
+                          </a:rPr>
+                          <m:t>+</m:t>
+                        </m:r>
+                        <m:r>
+                          <a:rPr lang="en-US" sz="2100" b="0" i="1" smtClean="0">
+                            <a:latin typeface="Cambria Math" panose="02040503050406030204" pitchFamily="18" charset="0"/>
+                          </a:rPr>
+                          <m:t>𝑉</m:t>
+                        </m:r>
+                        <m:r>
+                          <a:rPr lang="en-US" sz="2100" b="0" i="1" smtClean="0">
+                            <a:latin typeface="Cambria Math" panose="02040503050406030204" pitchFamily="18" charset="0"/>
+                          </a:rPr>
+                          <m:t>∗</m:t>
+                        </m:r>
+                        <m:r>
+                          <a:rPr lang="en-US" sz="2100" b="0" i="1" smtClean="0">
+                            <a:latin typeface="Cambria Math" panose="02040503050406030204" pitchFamily="18" charset="0"/>
+                          </a:rPr>
+                          <m:t>𝑢</m:t>
+                        </m:r>
+                        <m:r>
+                          <a:rPr lang="en-US" sz="2100" b="0" i="1" smtClean="0">
+                            <a:latin typeface="Cambria Math" panose="02040503050406030204" pitchFamily="18" charset="0"/>
+                          </a:rPr>
+                          <m:t>(</m:t>
+                        </m:r>
+                        <m:r>
+                          <a:rPr lang="en-US" sz="2100" b="0" i="1" smtClean="0">
+                            <a:latin typeface="Cambria Math" panose="02040503050406030204" pitchFamily="18" charset="0"/>
+                          </a:rPr>
+                          <m:t>𝑣</m:t>
+                        </m:r>
+                        <m:r>
+                          <a:rPr lang="en-US" sz="2100" b="0" i="1" smtClean="0">
+                            <a:latin typeface="Cambria Math" panose="02040503050406030204" pitchFamily="18" charset="0"/>
+                          </a:rPr>
+                          <m:t>)</m:t>
+                        </m:r>
                       </m:e>
                     </m:d>
                   </m:oMath>
@@ -8404,35 +8400,29 @@
                           <a:rPr lang="en-US" sz="2100" b="0" i="1" smtClean="0">
                             <a:latin typeface="Cambria Math" panose="02040503050406030204" pitchFamily="18" charset="0"/>
                           </a:rPr>
-                          <m:t>∗</m:t>
+                          <m:t>∗2</m:t>
                         </m:r>
-                        <m:d>
-                          <m:dPr>
+                        <m:r>
+                          <a:rPr lang="en-US" sz="2100" b="0" i="1" smtClean="0">
+                            <a:latin typeface="Cambria Math" panose="02040503050406030204" pitchFamily="18" charset="0"/>
+                          </a:rPr>
+                          <m:t>𝑉</m:t>
+                        </m:r>
+                        <m:r>
+                          <a:rPr lang="en-US" sz="2100" b="0" i="1" smtClean="0">
+                            <a:latin typeface="Cambria Math" panose="02040503050406030204" pitchFamily="18" charset="0"/>
+                          </a:rPr>
+                          <m:t>+</m:t>
+                        </m:r>
+                        <m:sSup>
+                          <m:sSupPr>
                             <m:ctrlPr>
                               <a:rPr lang="en-US" sz="2100" b="0" i="1" smtClean="0">
                                 <a:latin typeface="Cambria Math" panose="02040503050406030204" pitchFamily="18" charset="0"/>
                               </a:rPr>
                             </m:ctrlPr>
-                          </m:dPr>
+                          </m:sSupPr>
                           <m:e>
-                            <m:r>
-                              <a:rPr lang="en-US" sz="2100" b="0" i="1" smtClean="0">
-                                <a:latin typeface="Cambria Math" panose="02040503050406030204" pitchFamily="18" charset="0"/>
-                              </a:rPr>
-                              <m:t>2</m:t>
-                            </m:r>
-                            <m:r>
-                              <a:rPr lang="en-US" sz="2100" b="0" i="1" smtClean="0">
-                                <a:latin typeface="Cambria Math" panose="02040503050406030204" pitchFamily="18" charset="0"/>
-                              </a:rPr>
-                              <m:t>𝑉</m:t>
-                            </m:r>
-                            <m:r>
-                              <a:rPr lang="en-US" sz="2100" b="0" i="1" smtClean="0">
-                                <a:latin typeface="Cambria Math" panose="02040503050406030204" pitchFamily="18" charset="0"/>
-                              </a:rPr>
-                              <m:t>+</m:t>
-                            </m:r>
                             <m:r>
                               <a:rPr lang="en-US" sz="2100" b="0" i="1" smtClean="0">
                                 <a:latin typeface="Cambria Math" panose="02040503050406030204" pitchFamily="18" charset="0"/>
@@ -8440,7 +8430,15 @@
                               <m:t>𝑉</m:t>
                             </m:r>
                           </m:e>
-                        </m:d>
+                          <m:sup>
+                            <m:r>
+                              <a:rPr lang="en-US" sz="2100" b="0" i="1" smtClean="0">
+                                <a:latin typeface="Cambria Math" panose="02040503050406030204" pitchFamily="18" charset="0"/>
+                              </a:rPr>
+                              <m:t>2</m:t>
+                            </m:r>
+                          </m:sup>
+                        </m:sSup>
                       </m:e>
                     </m:d>
                     <m:r>
@@ -8765,7 +8763,7 @@
             </p:txBody>
           </p:sp>
         </mc:Choice>
-        <mc:Fallback xmlns="">
+        <mc:Fallback>
           <p:sp>
             <p:nvSpPr>
               <p:cNvPr id="78852" name="Rectangle 3"/>
@@ -8775,7 +8773,7 @@
               <p:nvPr>
                 <p:ph sz="quarter" idx="1"/>
                 <p:custDataLst>
-                  <p:tags r:id="rId4"/>
+                  <p:tags r:id="rId2"/>
                 </p:custDataLst>
               </p:nvPr>
             </p:nvSpPr>
@@ -8785,7 +8783,7 @@
                 <a:ext cx="10972800" cy="4724400"/>
               </a:xfrm>
               <a:blipFill>
-                <a:blip r:embed="rId5"/>
+                <a:blip r:embed="rId4"/>
                 <a:stretch>
                   <a:fillRect l="-579" t="-1877"/>
                 </a:stretch>
@@ -11421,7 +11419,7 @@
             </a:pPr>
             <a:r>
               <a:rPr lang="en-US" dirty="0"/>
-              <a:t>  0      1     2     3      4      5      6      7</a:t>
+              <a:t>  0      1     2     3      5      5      6      7</a:t>
             </a:r>
           </a:p>
         </p:txBody>
@@ -12533,7 +12531,7 @@
             </a:pPr>
             <a:r>
               <a:rPr lang="en-US" dirty="0"/>
-              <a:t>  0      1     2     3      4      5      6      7</a:t>
+              <a:t>  0      2     4     3      5      5      6      7</a:t>
             </a:r>
           </a:p>
         </p:txBody>
@@ -13553,7 +13551,7 @@
             </a:pPr>
             <a:r>
               <a:rPr lang="en-US" dirty="0"/>
-              <a:t>  0      1     2     3      4      5      6      7</a:t>
+              <a:t>  0      1     1     3      4      4      4      6</a:t>
             </a:r>
           </a:p>
         </p:txBody>
@@ -19114,6 +19112,12 @@
 </p:tagLst>
 </file>
 
+<file path=ppt/tags/tag116.xml><?xml version="1.0" encoding="utf-8"?>
+<p:tagLst xmlns:a="http://schemas.openxmlformats.org/drawingml/2006/main" xmlns:r="http://schemas.openxmlformats.org/officeDocument/2006/relationships" xmlns:p="http://schemas.openxmlformats.org/presentationml/2006/main">
+  <p:tag name="_INSTRUCTOR VIEW19C14C36-AC8E-43BC-9DB6-C2AAF774C7DC|PANE__TAG" val="_"/>
+</p:tagLst>
+</file>
+
 <file path=ppt/tags/tag117.xml><?xml version="1.0" encoding="utf-8"?>
 <p:tagLst xmlns:a="http://schemas.openxmlformats.org/drawingml/2006/main" xmlns:r="http://schemas.openxmlformats.org/officeDocument/2006/relationships" xmlns:p="http://schemas.openxmlformats.org/presentationml/2006/main">
   <p:tag name="_INSTRUCTOR VIEW19C14C36-AC8E-43BC-9DB6-C2AAF774C7DC|PANE__TAG" val="_"/>
@@ -19223,12 +19227,6 @@
 </file>
 
 <file path=ppt/tags/tag133.xml><?xml version="1.0" encoding="utf-8"?>
-<p:tagLst xmlns:a="http://schemas.openxmlformats.org/drawingml/2006/main" xmlns:r="http://schemas.openxmlformats.org/officeDocument/2006/relationships" xmlns:p="http://schemas.openxmlformats.org/presentationml/2006/main">
-  <p:tag name="_INSTRUCTOR VIEW19C14C36-AC8E-43BC-9DB6-C2AAF774C7DC|PANE__TAG" val="_"/>
-</p:tagLst>
-</file>
-
-<file path=ppt/tags/tag134.xml><?xml version="1.0" encoding="utf-8"?>
 <p:tagLst xmlns:a="http://schemas.openxmlformats.org/drawingml/2006/main" xmlns:r="http://schemas.openxmlformats.org/officeDocument/2006/relationships" xmlns:p="http://schemas.openxmlformats.org/presentationml/2006/main">
   <p:tag name="_INSTRUCTOR VIEW19C14C36-AC8E-43BC-9DB6-C2AAF774C7DC|PANE__TAG" val="_"/>
 </p:tagLst>

</xml_diff>